<commit_message>
added pagila installation instructions
</commit_message>
<xml_diff>
--- a/Chapter 2. Python for Data Scientists/Module 2. SQL/0. SQL Basics.pptx
+++ b/Chapter 2. Python for Data Scientists/Module 2. SQL/0. SQL Basics.pptx
@@ -222,7 +222,7 @@
           <a:p>
             <a:fld id="{80B64C77-9D78-44FE-9ADF-5B34B4EB5355}" type="datetimeFigureOut">
               <a:rPr lang="en-GB" smtClean="0"/>
-              <a:t>12/07/2020</a:t>
+              <a:t>29/08/2020</a:t>
             </a:fld>
             <a:endParaRPr lang="en-GB"/>
           </a:p>
@@ -902,7 +902,7 @@
           <a:p>
             <a:fld id="{2BD79546-4292-419A-B57D-BBC62FF6679C}" type="datetimeFigureOut">
               <a:rPr lang="en-GB" smtClean="0"/>
-              <a:t>12/07/2020</a:t>
+              <a:t>29/08/2020</a:t>
             </a:fld>
             <a:endParaRPr lang="en-GB"/>
           </a:p>
@@ -1102,7 +1102,7 @@
           <a:p>
             <a:fld id="{2BD79546-4292-419A-B57D-BBC62FF6679C}" type="datetimeFigureOut">
               <a:rPr lang="en-GB" smtClean="0"/>
-              <a:t>12/07/2020</a:t>
+              <a:t>29/08/2020</a:t>
             </a:fld>
             <a:endParaRPr lang="en-GB"/>
           </a:p>
@@ -1312,7 +1312,7 @@
           <a:p>
             <a:fld id="{2BD79546-4292-419A-B57D-BBC62FF6679C}" type="datetimeFigureOut">
               <a:rPr lang="en-GB" smtClean="0"/>
-              <a:t>12/07/2020</a:t>
+              <a:t>29/08/2020</a:t>
             </a:fld>
             <a:endParaRPr lang="en-GB"/>
           </a:p>
@@ -1512,7 +1512,7 @@
           <a:p>
             <a:fld id="{2BD79546-4292-419A-B57D-BBC62FF6679C}" type="datetimeFigureOut">
               <a:rPr lang="en-GB" smtClean="0"/>
-              <a:t>12/07/2020</a:t>
+              <a:t>29/08/2020</a:t>
             </a:fld>
             <a:endParaRPr lang="en-GB"/>
           </a:p>
@@ -1788,7 +1788,7 @@
           <a:p>
             <a:fld id="{2BD79546-4292-419A-B57D-BBC62FF6679C}" type="datetimeFigureOut">
               <a:rPr lang="en-GB" smtClean="0"/>
-              <a:t>12/07/2020</a:t>
+              <a:t>29/08/2020</a:t>
             </a:fld>
             <a:endParaRPr lang="en-GB"/>
           </a:p>
@@ -2056,7 +2056,7 @@
           <a:p>
             <a:fld id="{2BD79546-4292-419A-B57D-BBC62FF6679C}" type="datetimeFigureOut">
               <a:rPr lang="en-GB" smtClean="0"/>
-              <a:t>12/07/2020</a:t>
+              <a:t>29/08/2020</a:t>
             </a:fld>
             <a:endParaRPr lang="en-GB"/>
           </a:p>
@@ -2471,7 +2471,7 @@
           <a:p>
             <a:fld id="{2BD79546-4292-419A-B57D-BBC62FF6679C}" type="datetimeFigureOut">
               <a:rPr lang="en-GB" smtClean="0"/>
-              <a:t>12/07/2020</a:t>
+              <a:t>29/08/2020</a:t>
             </a:fld>
             <a:endParaRPr lang="en-GB"/>
           </a:p>
@@ -2613,7 +2613,7 @@
           <a:p>
             <a:fld id="{2BD79546-4292-419A-B57D-BBC62FF6679C}" type="datetimeFigureOut">
               <a:rPr lang="en-GB" smtClean="0"/>
-              <a:t>12/07/2020</a:t>
+              <a:t>29/08/2020</a:t>
             </a:fld>
             <a:endParaRPr lang="en-GB"/>
           </a:p>
@@ -2726,7 +2726,7 @@
           <a:p>
             <a:fld id="{2BD79546-4292-419A-B57D-BBC62FF6679C}" type="datetimeFigureOut">
               <a:rPr lang="en-GB" smtClean="0"/>
-              <a:t>12/07/2020</a:t>
+              <a:t>29/08/2020</a:t>
             </a:fld>
             <a:endParaRPr lang="en-GB"/>
           </a:p>
@@ -3039,7 +3039,7 @@
           <a:p>
             <a:fld id="{2BD79546-4292-419A-B57D-BBC62FF6679C}" type="datetimeFigureOut">
               <a:rPr lang="en-GB" smtClean="0"/>
-              <a:t>12/07/2020</a:t>
+              <a:t>29/08/2020</a:t>
             </a:fld>
             <a:endParaRPr lang="en-GB"/>
           </a:p>
@@ -3328,7 +3328,7 @@
           <a:p>
             <a:fld id="{2BD79546-4292-419A-B57D-BBC62FF6679C}" type="datetimeFigureOut">
               <a:rPr lang="en-GB" smtClean="0"/>
-              <a:t>12/07/2020</a:t>
+              <a:t>29/08/2020</a:t>
             </a:fld>
             <a:endParaRPr lang="en-GB"/>
           </a:p>
@@ -3571,7 +3571,7 @@
           <a:p>
             <a:fld id="{2BD79546-4292-419A-B57D-BBC62FF6679C}" type="datetimeFigureOut">
               <a:rPr lang="en-GB" smtClean="0"/>
-              <a:t>12/07/2020</a:t>
+              <a:t>29/08/2020</a:t>
             </a:fld>
             <a:endParaRPr lang="en-GB"/>
           </a:p>
@@ -6564,7 +6564,7 @@
           <a:p>
             <a:r>
               <a:rPr lang="en-GB" dirty="0"/>
-              <a:t>Learning objectives</a:t>
+              <a:t>Over the course of this module</a:t>
             </a:r>
           </a:p>
         </p:txBody>
@@ -6590,7 +6590,28 @@
           <a:bodyPr/>
           <a:lstStyle/>
           <a:p>
-            <a:endParaRPr lang="en-GB"/>
+            <a:r>
+              <a:rPr lang="en-GB" dirty="0"/>
+              <a:t>We will start by learning the basics of SQL: The SELECT statement and a few other common operators that we’ll use</a:t>
+            </a:r>
+          </a:p>
+          <a:p>
+            <a:r>
+              <a:rPr lang="en-GB" dirty="0"/>
+              <a:t>We will then move to Joins – which is a way of joining two SQL tables together</a:t>
+            </a:r>
+          </a:p>
+          <a:p>
+            <a:r>
+              <a:rPr lang="en-GB" dirty="0"/>
+              <a:t>Subsequently, we will look at Aggregations. That is, we’ve obtained some data, but how can create higher level ‘statistics’ about them</a:t>
+            </a:r>
+          </a:p>
+          <a:p>
+            <a:r>
+              <a:rPr lang="en-GB" dirty="0"/>
+              <a:t>Finally, we will look at Subqueries – a technique which will allow us to queries within queries.</a:t>
+            </a:r>
           </a:p>
         </p:txBody>
       </p:sp>
@@ -8590,13 +8611,12 @@
               <a:t> Postgres port of an open-source sample database known as </a:t>
             </a:r>
             <a:r>
-              <a:rPr lang="en-GB" b="1" dirty="0" err="1"/>
+              <a:rPr lang="en-GB" b="1" dirty="0" err="1">
+                <a:hlinkClick r:id="rId2"/>
+              </a:rPr>
               <a:t>Sakila</a:t>
             </a:r>
-            <a:r>
-              <a:rPr lang="en-GB" dirty="0"/>
-              <a:t> (LINK THIS)</a:t>
-            </a:r>
+            <a:endParaRPr lang="en-GB" dirty="0"/>
           </a:p>
           <a:p>
             <a:r>
@@ -8607,6 +8627,123 @@
               <a:rPr lang="en-GB" dirty="0"/>
               <a:t> is a database which models a DVD rental store. It features films, actors, film-actor relationships, and a central inventory table that connects films, stores, and rentals. </a:t>
             </a:r>
+          </a:p>
+          <a:p>
+            <a:endParaRPr lang="en-GB" dirty="0"/>
+          </a:p>
+          <a:p>
+            <a:r>
+              <a:rPr lang="en-GB" sz="2000" dirty="0" err="1">
+                <a:latin typeface="Courier New" panose="02070309020205020404" pitchFamily="49" charset="0"/>
+                <a:cs typeface="Courier New" panose="02070309020205020404" pitchFamily="49" charset="0"/>
+              </a:rPr>
+              <a:t>psql</a:t>
+            </a:r>
+            <a:r>
+              <a:rPr lang="en-GB" sz="2000" dirty="0">
+                <a:latin typeface="Courier New" panose="02070309020205020404" pitchFamily="49" charset="0"/>
+                <a:cs typeface="Courier New" panose="02070309020205020404" pitchFamily="49" charset="0"/>
+              </a:rPr>
+              <a:t> -c "CREATE DATABASE </a:t>
+            </a:r>
+            <a:r>
+              <a:rPr lang="en-GB" sz="2000" dirty="0" err="1">
+                <a:latin typeface="Courier New" panose="02070309020205020404" pitchFamily="49" charset="0"/>
+                <a:cs typeface="Courier New" panose="02070309020205020404" pitchFamily="49" charset="0"/>
+              </a:rPr>
+              <a:t>pagila</a:t>
+            </a:r>
+            <a:r>
+              <a:rPr lang="en-GB" sz="2000" dirty="0">
+                <a:latin typeface="Courier New" panose="02070309020205020404" pitchFamily="49" charset="0"/>
+                <a:cs typeface="Courier New" panose="02070309020205020404" pitchFamily="49" charset="0"/>
+              </a:rPr>
+              <a:t>;"</a:t>
+            </a:r>
+            <a:br>
+              <a:rPr lang="en-GB" dirty="0"/>
+            </a:br>
+            <a:r>
+              <a:rPr lang="en-GB" sz="1800" dirty="0" err="1">
+                <a:latin typeface="Courier New" panose="02070309020205020404" pitchFamily="49" charset="0"/>
+                <a:cs typeface="Courier New" panose="02070309020205020404" pitchFamily="49" charset="0"/>
+              </a:rPr>
+              <a:t>psql</a:t>
+            </a:r>
+            <a:r>
+              <a:rPr lang="en-GB" sz="1800" dirty="0">
+                <a:latin typeface="Courier New" panose="02070309020205020404" pitchFamily="49" charset="0"/>
+                <a:cs typeface="Courier New" panose="02070309020205020404" pitchFamily="49" charset="0"/>
+              </a:rPr>
+              <a:t> -d </a:t>
+            </a:r>
+            <a:r>
+              <a:rPr lang="en-GB" sz="1800" dirty="0" err="1">
+                <a:latin typeface="Courier New" panose="02070309020205020404" pitchFamily="49" charset="0"/>
+                <a:cs typeface="Courier New" panose="02070309020205020404" pitchFamily="49" charset="0"/>
+              </a:rPr>
+              <a:t>pagila</a:t>
+            </a:r>
+            <a:r>
+              <a:rPr lang="en-GB" sz="1800" dirty="0">
+                <a:latin typeface="Courier New" panose="02070309020205020404" pitchFamily="49" charset="0"/>
+                <a:cs typeface="Courier New" panose="02070309020205020404" pitchFamily="49" charset="0"/>
+              </a:rPr>
+              <a:t> -f </a:t>
+            </a:r>
+            <a:r>
+              <a:rPr lang="en-GB" sz="1800" dirty="0" err="1">
+                <a:latin typeface="Courier New" panose="02070309020205020404" pitchFamily="49" charset="0"/>
+                <a:cs typeface="Courier New" panose="02070309020205020404" pitchFamily="49" charset="0"/>
+              </a:rPr>
+              <a:t>pagila-schema.sql</a:t>
+            </a:r>
+            <a:r>
+              <a:rPr lang="en-GB" dirty="0"/>
+              <a:t> OR </a:t>
+            </a:r>
+            <a:r>
+              <a:rPr lang="en-GB" sz="1800" dirty="0" err="1">
+                <a:latin typeface="Courier New" panose="02070309020205020404" pitchFamily="49" charset="0"/>
+                <a:cs typeface="Courier New" panose="02070309020205020404" pitchFamily="49" charset="0"/>
+              </a:rPr>
+              <a:t>psql</a:t>
+            </a:r>
+            <a:r>
+              <a:rPr lang="en-GB" sz="1800" dirty="0">
+                <a:latin typeface="Courier New" panose="02070309020205020404" pitchFamily="49" charset="0"/>
+                <a:cs typeface="Courier New" panose="02070309020205020404" pitchFamily="49" charset="0"/>
+              </a:rPr>
+              <a:t> -d </a:t>
+            </a:r>
+            <a:r>
+              <a:rPr lang="en-GB" sz="1800" dirty="0" err="1">
+                <a:latin typeface="Courier New" panose="02070309020205020404" pitchFamily="49" charset="0"/>
+                <a:cs typeface="Courier New" panose="02070309020205020404" pitchFamily="49" charset="0"/>
+              </a:rPr>
+              <a:t>pagila</a:t>
+            </a:r>
+            <a:r>
+              <a:rPr lang="en-GB" sz="1800" dirty="0">
+                <a:latin typeface="Courier New" panose="02070309020205020404" pitchFamily="49" charset="0"/>
+                <a:cs typeface="Courier New" panose="02070309020205020404" pitchFamily="49" charset="0"/>
+              </a:rPr>
+              <a:t> -f </a:t>
+            </a:r>
+            <a:r>
+              <a:rPr lang="en-GB" sz="1800" dirty="0" err="1">
+                <a:latin typeface="Courier New" panose="02070309020205020404" pitchFamily="49" charset="0"/>
+                <a:cs typeface="Courier New" panose="02070309020205020404" pitchFamily="49" charset="0"/>
+              </a:rPr>
+              <a:t>pagila-data.sql</a:t>
+            </a:r>
+            <a:endParaRPr lang="en-GB" dirty="0">
+              <a:latin typeface="Courier New" panose="02070309020205020404" pitchFamily="49" charset="0"/>
+              <a:cs typeface="Courier New" panose="02070309020205020404" pitchFamily="49" charset="0"/>
+            </a:endParaRPr>
+          </a:p>
+          <a:p>
+            <a:endParaRPr lang="en-GB" dirty="0"/>
           </a:p>
         </p:txBody>
       </p:sp>

</xml_diff>

<commit_message>
updated ppt and some things from module 3
</commit_message>
<xml_diff>
--- a/Chapter 2. Python for Data Scientists/Module 2. SQL/0. SQL Basics.pptx
+++ b/Chapter 2. Python for Data Scientists/Module 2. SQL/0. SQL Basics.pptx
@@ -222,7 +222,7 @@
           <a:p>
             <a:fld id="{80B64C77-9D78-44FE-9ADF-5B34B4EB5355}" type="datetimeFigureOut">
               <a:rPr lang="en-GB" smtClean="0"/>
-              <a:t>31/08/2020</a:t>
+              <a:t>01/09/2020</a:t>
             </a:fld>
             <a:endParaRPr lang="en-GB"/>
           </a:p>
@@ -902,7 +902,7 @@
           <a:p>
             <a:fld id="{2BD79546-4292-419A-B57D-BBC62FF6679C}" type="datetimeFigureOut">
               <a:rPr lang="en-GB" smtClean="0"/>
-              <a:t>31/08/2020</a:t>
+              <a:t>01/09/2020</a:t>
             </a:fld>
             <a:endParaRPr lang="en-GB"/>
           </a:p>
@@ -1102,7 +1102,7 @@
           <a:p>
             <a:fld id="{2BD79546-4292-419A-B57D-BBC62FF6679C}" type="datetimeFigureOut">
               <a:rPr lang="en-GB" smtClean="0"/>
-              <a:t>31/08/2020</a:t>
+              <a:t>01/09/2020</a:t>
             </a:fld>
             <a:endParaRPr lang="en-GB"/>
           </a:p>
@@ -1312,7 +1312,7 @@
           <a:p>
             <a:fld id="{2BD79546-4292-419A-B57D-BBC62FF6679C}" type="datetimeFigureOut">
               <a:rPr lang="en-GB" smtClean="0"/>
-              <a:t>31/08/2020</a:t>
+              <a:t>01/09/2020</a:t>
             </a:fld>
             <a:endParaRPr lang="en-GB"/>
           </a:p>
@@ -1512,7 +1512,7 @@
           <a:p>
             <a:fld id="{2BD79546-4292-419A-B57D-BBC62FF6679C}" type="datetimeFigureOut">
               <a:rPr lang="en-GB" smtClean="0"/>
-              <a:t>31/08/2020</a:t>
+              <a:t>01/09/2020</a:t>
             </a:fld>
             <a:endParaRPr lang="en-GB"/>
           </a:p>
@@ -1788,7 +1788,7 @@
           <a:p>
             <a:fld id="{2BD79546-4292-419A-B57D-BBC62FF6679C}" type="datetimeFigureOut">
               <a:rPr lang="en-GB" smtClean="0"/>
-              <a:t>31/08/2020</a:t>
+              <a:t>01/09/2020</a:t>
             </a:fld>
             <a:endParaRPr lang="en-GB"/>
           </a:p>
@@ -2056,7 +2056,7 @@
           <a:p>
             <a:fld id="{2BD79546-4292-419A-B57D-BBC62FF6679C}" type="datetimeFigureOut">
               <a:rPr lang="en-GB" smtClean="0"/>
-              <a:t>31/08/2020</a:t>
+              <a:t>01/09/2020</a:t>
             </a:fld>
             <a:endParaRPr lang="en-GB"/>
           </a:p>
@@ -2471,7 +2471,7 @@
           <a:p>
             <a:fld id="{2BD79546-4292-419A-B57D-BBC62FF6679C}" type="datetimeFigureOut">
               <a:rPr lang="en-GB" smtClean="0"/>
-              <a:t>31/08/2020</a:t>
+              <a:t>01/09/2020</a:t>
             </a:fld>
             <a:endParaRPr lang="en-GB"/>
           </a:p>
@@ -2613,7 +2613,7 @@
           <a:p>
             <a:fld id="{2BD79546-4292-419A-B57D-BBC62FF6679C}" type="datetimeFigureOut">
               <a:rPr lang="en-GB" smtClean="0"/>
-              <a:t>31/08/2020</a:t>
+              <a:t>01/09/2020</a:t>
             </a:fld>
             <a:endParaRPr lang="en-GB"/>
           </a:p>
@@ -2726,7 +2726,7 @@
           <a:p>
             <a:fld id="{2BD79546-4292-419A-B57D-BBC62FF6679C}" type="datetimeFigureOut">
               <a:rPr lang="en-GB" smtClean="0"/>
-              <a:t>31/08/2020</a:t>
+              <a:t>01/09/2020</a:t>
             </a:fld>
             <a:endParaRPr lang="en-GB"/>
           </a:p>
@@ -3039,7 +3039,7 @@
           <a:p>
             <a:fld id="{2BD79546-4292-419A-B57D-BBC62FF6679C}" type="datetimeFigureOut">
               <a:rPr lang="en-GB" smtClean="0"/>
-              <a:t>31/08/2020</a:t>
+              <a:t>01/09/2020</a:t>
             </a:fld>
             <a:endParaRPr lang="en-GB"/>
           </a:p>
@@ -3328,7 +3328,7 @@
           <a:p>
             <a:fld id="{2BD79546-4292-419A-B57D-BBC62FF6679C}" type="datetimeFigureOut">
               <a:rPr lang="en-GB" smtClean="0"/>
-              <a:t>31/08/2020</a:t>
+              <a:t>01/09/2020</a:t>
             </a:fld>
             <a:endParaRPr lang="en-GB"/>
           </a:p>
@@ -3571,7 +3571,7 @@
           <a:p>
             <a:fld id="{2BD79546-4292-419A-B57D-BBC62FF6679C}" type="datetimeFigureOut">
               <a:rPr lang="en-GB" smtClean="0"/>
-              <a:t>31/08/2020</a:t>
+              <a:t>01/09/2020</a:t>
             </a:fld>
             <a:endParaRPr lang="en-GB"/>
           </a:p>
@@ -8109,7 +8109,7 @@
         <p:spPr/>
         <p:txBody>
           <a:bodyPr>
-            <a:normAutofit fontScale="70000" lnSpcReduction="20000"/>
+            <a:normAutofit fontScale="85000" lnSpcReduction="10000"/>
           </a:bodyPr>
           <a:lstStyle/>
           <a:p>
@@ -8118,8 +8118,8 @@
               <a:buAutoNum type="arabicPeriod"/>
             </a:pPr>
             <a:r>
-              <a:rPr lang="en-GB" dirty="0"/>
-              <a:t>Find all the cities which begin with “al-”</a:t>
+              <a:rPr lang="en-GB" sz="2400" dirty="0"/>
+              <a:t>Find all the cities which begin with “al”</a:t>
             </a:r>
           </a:p>
           <a:p>
@@ -8128,7 +8128,7 @@
               <a:buAutoNum type="arabicPeriod"/>
             </a:pPr>
             <a:r>
-              <a:rPr lang="en-GB" dirty="0"/>
+              <a:rPr lang="en-GB" sz="2400" dirty="0"/>
               <a:t>Find all the actors who’s first name doesn’t end in “EN”</a:t>
             </a:r>
           </a:p>
@@ -8138,7 +8138,7 @@
               <a:buAutoNum type="arabicPeriod"/>
             </a:pPr>
             <a:r>
-              <a:rPr lang="en-GB" dirty="0"/>
+              <a:rPr lang="en-GB" sz="2400" dirty="0"/>
               <a:t>Find all the actors who’s first name doesn’t end in “EN” and have an ID greater than 100</a:t>
             </a:r>
           </a:p>
@@ -8148,7 +8148,7 @@
               <a:buAutoNum type="arabicPeriod"/>
             </a:pPr>
             <a:r>
-              <a:rPr lang="en-GB" dirty="0"/>
+              <a:rPr lang="en-GB" sz="2400" dirty="0"/>
               <a:t>Find all the actors who’s first name doesn’t end in “EN”, have an ID greater than 100, and have a last name that ends in “D”. Order the results by the last name in descending order.</a:t>
             </a:r>
           </a:p>
@@ -8158,7 +8158,7 @@
               <a:buAutoNum type="arabicPeriod"/>
             </a:pPr>
             <a:r>
-              <a:rPr lang="en-GB" dirty="0"/>
+              <a:rPr lang="en-GB" sz="2400" dirty="0"/>
               <a:t>Return only the address of addresses in either the Alberta or QLD district</a:t>
             </a:r>
           </a:p>
@@ -8168,8 +8168,26 @@
               <a:buAutoNum type="arabicPeriod"/>
             </a:pPr>
             <a:r>
-              <a:rPr lang="en-GB" dirty="0"/>
-              <a:t>Return film titles and descriptions of films who’s lengths are between 80 and 100 minutes</a:t>
+              <a:rPr lang="en-GB" sz="2400" dirty="0"/>
+              <a:t>Find actors who’s first name begins with “mi” or last name ends with “</a:t>
+            </a:r>
+            <a:r>
+              <a:rPr lang="en-GB" sz="2400" dirty="0" err="1"/>
+              <a:t>ing</a:t>
+            </a:r>
+            <a:r>
+              <a:rPr lang="en-GB" sz="2400" dirty="0"/>
+              <a:t>”</a:t>
+            </a:r>
+          </a:p>
+          <a:p>
+            <a:pPr marL="971550" lvl="1" indent="-514350">
+              <a:buFont typeface="+mj-lt"/>
+              <a:buAutoNum type="arabicPeriod"/>
+            </a:pPr>
+            <a:r>
+              <a:rPr lang="en-GB" sz="1800" dirty="0"/>
+              <a:t>What’s the difference in results if you use an AND instead of an OR?</a:t>
             </a:r>
           </a:p>
           <a:p>
@@ -8178,26 +8196,8 @@
               <a:buAutoNum type="arabicPeriod"/>
             </a:pPr>
             <a:r>
-              <a:rPr lang="en-GB" dirty="0"/>
-              <a:t>Find actors who’s first name begins with “mi” or ends with “</a:t>
-            </a:r>
-            <a:r>
-              <a:rPr lang="en-GB" dirty="0" err="1"/>
-              <a:t>ing</a:t>
-            </a:r>
-            <a:r>
-              <a:rPr lang="en-GB" dirty="0"/>
-              <a:t>”</a:t>
-            </a:r>
-          </a:p>
-          <a:p>
-            <a:pPr marL="971550" lvl="1" indent="-514350">
-              <a:buFont typeface="+mj-lt"/>
-              <a:buAutoNum type="arabicPeriod"/>
-            </a:pPr>
-            <a:r>
-              <a:rPr lang="en-GB" dirty="0"/>
-              <a:t>What’s the difference in results if you use an AND instead of an OR?</a:t>
+              <a:rPr lang="en-GB" sz="2400" dirty="0"/>
+              <a:t>Return film titles and descriptions of films who’s lengths are between 80 and 100 minutes,</a:t>
             </a:r>
           </a:p>
           <a:p>
@@ -8206,25 +8206,15 @@
               <a:buAutoNum type="arabicPeriod"/>
             </a:pPr>
             <a:r>
-              <a:rPr lang="en-GB" dirty="0"/>
-              <a:t>Return film titles and descriptions of films who’s lengths are between 80 and 100 minutes,</a:t>
-            </a:r>
-          </a:p>
-          <a:p>
-            <a:pPr marL="514350" indent="-514350">
-              <a:buFont typeface="+mj-lt"/>
-              <a:buAutoNum type="arabicPeriod"/>
-            </a:pPr>
-            <a:r>
-              <a:rPr lang="en-GB" dirty="0"/>
-              <a:t>Return film titles and descriptions of films who’s lengths are between 80 and 100 minutes, and have a rental period between 5 and 7 days or have a replacement cost between $17 and $22</a:t>
+              <a:rPr lang="en-GB" sz="2400" dirty="0"/>
+              <a:t>Return film titles and descriptions of films who’s lengths are between 80 and 100 minutes. Further filter these results by films which have a rental period between 5 and 7 days or have a replacement cost between $17 and $22</a:t>
             </a:r>
           </a:p>
           <a:p>
             <a:pPr marL="457200" lvl="1" indent="0">
               <a:buNone/>
             </a:pPr>
-            <a:endParaRPr lang="en-GB" dirty="0"/>
+            <a:endParaRPr lang="en-GB" sz="1800" dirty="0"/>
           </a:p>
         </p:txBody>
       </p:sp>

</xml_diff>